<commit_message>
physical form of data
</commit_message>
<xml_diff>
--- a/DBMS Notes/lec2Notes.pptx
+++ b/DBMS Notes/lec2Notes.pptx
@@ -6489,11 +6489,41 @@
           <a:p>
             <a:r>
               <a:rPr lang="en-US" dirty="0" smtClean="0"/>
-              <a:t>Physical level </a:t>
+              <a:t>Physical level of abstraction </a:t>
+            </a:r>
+            <a:endParaRPr lang="en-US" dirty="0"/>
+          </a:p>
+        </p:txBody>
+      </p:sp>
+      <p:sp>
+        <p:nvSpPr>
+          <p:cNvPr id="5" name="TextBox 4"/>
+          <p:cNvSpPr txBox="1"/>
+          <p:nvPr/>
+        </p:nvSpPr>
+        <p:spPr>
+          <a:xfrm>
+            <a:off x="1302783" y="1917700"/>
+            <a:ext cx="5410200" cy="646331"/>
+          </a:xfrm>
+          <a:prstGeom prst="rect">
+            <a:avLst/>
+          </a:prstGeom>
+          <a:noFill/>
+        </p:spPr>
+        <p:txBody>
+          <a:bodyPr wrap="square" rtlCol="0">
+            <a:spAutoFit/>
+          </a:bodyPr>
+          <a:lstStyle/>
+          <a:p>
+            <a:r>
+              <a:rPr lang="en-US" dirty="0" smtClean="0"/>
+              <a:t>Basically to store data in such a way that it is easy for us to access and fetch </a:t>
             </a:r>
             <a:r>
               <a:rPr lang="en-US" smtClean="0"/>
-              <a:t>of abstraction </a:t>
+              <a:t>data easily.</a:t>
             </a:r>
             <a:endParaRPr lang="en-US"/>
           </a:p>

</xml_diff>